<commit_message>
Code changes for Load Testing by Selmate.
</commit_message>
<xml_diff>
--- a/TUTORIAL.pptx
+++ b/TUTORIAL.pptx
@@ -280,7 +280,7 @@
           <a:p>
             <a:fld id="{842CDB2F-11C8-47D8-BA5B-1ECFEA30C81C}" type="datetimeFigureOut">
               <a:rPr lang="en-US" smtClean="0"/>
-              <a:t>3/6/2020</a:t>
+              <a:t>7/24/2020</a:t>
             </a:fld>
             <a:endParaRPr lang="en-US"/>
           </a:p>
@@ -478,7 +478,7 @@
           <a:p>
             <a:fld id="{842CDB2F-11C8-47D8-BA5B-1ECFEA30C81C}" type="datetimeFigureOut">
               <a:rPr lang="en-US" smtClean="0"/>
-              <a:t>3/6/2020</a:t>
+              <a:t>7/24/2020</a:t>
             </a:fld>
             <a:endParaRPr lang="en-US"/>
           </a:p>
@@ -686,7 +686,7 @@
           <a:p>
             <a:fld id="{842CDB2F-11C8-47D8-BA5B-1ECFEA30C81C}" type="datetimeFigureOut">
               <a:rPr lang="en-US" smtClean="0"/>
-              <a:t>3/6/2020</a:t>
+              <a:t>7/24/2020</a:t>
             </a:fld>
             <a:endParaRPr lang="en-US"/>
           </a:p>
@@ -884,7 +884,7 @@
           <a:p>
             <a:fld id="{842CDB2F-11C8-47D8-BA5B-1ECFEA30C81C}" type="datetimeFigureOut">
               <a:rPr lang="en-US" smtClean="0"/>
-              <a:t>3/6/2020</a:t>
+              <a:t>7/24/2020</a:t>
             </a:fld>
             <a:endParaRPr lang="en-US"/>
           </a:p>
@@ -1159,7 +1159,7 @@
           <a:p>
             <a:fld id="{842CDB2F-11C8-47D8-BA5B-1ECFEA30C81C}" type="datetimeFigureOut">
               <a:rPr lang="en-US" smtClean="0"/>
-              <a:t>3/6/2020</a:t>
+              <a:t>7/24/2020</a:t>
             </a:fld>
             <a:endParaRPr lang="en-US"/>
           </a:p>
@@ -1424,7 +1424,7 @@
           <a:p>
             <a:fld id="{842CDB2F-11C8-47D8-BA5B-1ECFEA30C81C}" type="datetimeFigureOut">
               <a:rPr lang="en-US" smtClean="0"/>
-              <a:t>3/6/2020</a:t>
+              <a:t>7/24/2020</a:t>
             </a:fld>
             <a:endParaRPr lang="en-US"/>
           </a:p>
@@ -1836,7 +1836,7 @@
           <a:p>
             <a:fld id="{842CDB2F-11C8-47D8-BA5B-1ECFEA30C81C}" type="datetimeFigureOut">
               <a:rPr lang="en-US" smtClean="0"/>
-              <a:t>3/6/2020</a:t>
+              <a:t>7/24/2020</a:t>
             </a:fld>
             <a:endParaRPr lang="en-US"/>
           </a:p>
@@ -1977,7 +1977,7 @@
           <a:p>
             <a:fld id="{842CDB2F-11C8-47D8-BA5B-1ECFEA30C81C}" type="datetimeFigureOut">
               <a:rPr lang="en-US" smtClean="0"/>
-              <a:t>3/6/2020</a:t>
+              <a:t>7/24/2020</a:t>
             </a:fld>
             <a:endParaRPr lang="en-US"/>
           </a:p>
@@ -2090,7 +2090,7 @@
           <a:p>
             <a:fld id="{842CDB2F-11C8-47D8-BA5B-1ECFEA30C81C}" type="datetimeFigureOut">
               <a:rPr lang="en-US" smtClean="0"/>
-              <a:t>3/6/2020</a:t>
+              <a:t>7/24/2020</a:t>
             </a:fld>
             <a:endParaRPr lang="en-US"/>
           </a:p>
@@ -2401,7 +2401,7 @@
           <a:p>
             <a:fld id="{842CDB2F-11C8-47D8-BA5B-1ECFEA30C81C}" type="datetimeFigureOut">
               <a:rPr lang="en-US" smtClean="0"/>
-              <a:t>3/6/2020</a:t>
+              <a:t>7/24/2020</a:t>
             </a:fld>
             <a:endParaRPr lang="en-US"/>
           </a:p>
@@ -2689,7 +2689,7 @@
           <a:p>
             <a:fld id="{842CDB2F-11C8-47D8-BA5B-1ECFEA30C81C}" type="datetimeFigureOut">
               <a:rPr lang="en-US" smtClean="0"/>
-              <a:t>3/6/2020</a:t>
+              <a:t>7/24/2020</a:t>
             </a:fld>
             <a:endParaRPr lang="en-US"/>
           </a:p>
@@ -2930,7 +2930,7 @@
           <a:p>
             <a:fld id="{842CDB2F-11C8-47D8-BA5B-1ECFEA30C81C}" type="datetimeFigureOut">
               <a:rPr lang="en-US" smtClean="0"/>
-              <a:t>3/6/2020</a:t>
+              <a:t>7/24/2020</a:t>
             </a:fld>
             <a:endParaRPr lang="en-US"/>
           </a:p>
@@ -4021,7 +4021,7 @@
           <a:graphicData uri="http://schemas.openxmlformats.org/presentationml/2006/ole">
             <mc:AlternateContent xmlns:mc="http://schemas.openxmlformats.org/markup-compatibility/2006">
               <mc:Choice xmlns:v="urn:schemas-microsoft-com:vml" Requires="v">
-                <p:oleObj spid="_x0000_s4277" name="Packager Shell Object" showAsIcon="1" r:id="rId3" imgW="1028160" imgH="863640" progId="Package">
+                <p:oleObj spid="_x0000_s4279" name="Packager Shell Object" showAsIcon="1" r:id="rId3" imgW="1028160" imgH="863640" progId="Package">
                   <p:embed/>
                 </p:oleObj>
               </mc:Choice>
@@ -4393,7 +4393,7 @@
           <a:graphicData uri="http://schemas.openxmlformats.org/presentationml/2006/ole">
             <mc:AlternateContent xmlns:mc="http://schemas.openxmlformats.org/markup-compatibility/2006">
               <mc:Choice xmlns:v="urn:schemas-microsoft-com:vml" Requires="v">
-                <p:oleObj spid="_x0000_s7231" name="Worksheet" showAsIcon="1" r:id="rId4" imgW="914400" imgH="792360" progId="Excel.Sheet.12">
+                <p:oleObj spid="_x0000_s7233" name="Worksheet" showAsIcon="1" r:id="rId4" imgW="914400" imgH="792360" progId="Excel.Sheet.12">
                   <p:embed/>
                 </p:oleObj>
               </mc:Choice>
@@ -4724,7 +4724,7 @@
           <a:graphicData uri="http://schemas.openxmlformats.org/presentationml/2006/ole">
             <mc:AlternateContent xmlns:mc="http://schemas.openxmlformats.org/markup-compatibility/2006">
               <mc:Choice xmlns:v="urn:schemas-microsoft-com:vml" Requires="v">
-                <p:oleObj spid="_x0000_s5432" name="Packager Shell Object" showAsIcon="1" r:id="rId3" imgW="1231200" imgH="863640" progId="Package">
+                <p:oleObj spid="_x0000_s5436" name="Packager Shell Object" showAsIcon="1" r:id="rId3" imgW="1231200" imgH="863640" progId="Package">
                   <p:embed/>
                 </p:oleObj>
               </mc:Choice>
@@ -4787,7 +4787,7 @@
           <a:graphicData uri="http://schemas.openxmlformats.org/presentationml/2006/ole">
             <mc:AlternateContent xmlns:mc="http://schemas.openxmlformats.org/markup-compatibility/2006">
               <mc:Choice xmlns:v="urn:schemas-microsoft-com:vml" Requires="v">
-                <p:oleObj spid="_x0000_s5433" name="Packager Shell Object" showAsIcon="1" r:id="rId5" imgW="3757320" imgH="863640" progId="Package">
+                <p:oleObj spid="_x0000_s5437" name="Packager Shell Object" showAsIcon="1" r:id="rId5" imgW="3757320" imgH="863640" progId="Package">
                   <p:embed/>
                 </p:oleObj>
               </mc:Choice>
@@ -5043,7 +5043,7 @@
           <a:graphicData uri="http://schemas.openxmlformats.org/presentationml/2006/ole">
             <mc:AlternateContent xmlns:mc="http://schemas.openxmlformats.org/markup-compatibility/2006">
               <mc:Choice xmlns:v="urn:schemas-microsoft-com:vml" Requires="v">
-                <p:oleObj spid="_x0000_s6303" name="Packager Shell Object" showAsIcon="1" r:id="rId3" imgW="2868840" imgH="863640" progId="Package">
+                <p:oleObj spid="_x0000_s6309" name="Packager Shell Object" showAsIcon="1" r:id="rId3" imgW="2868840" imgH="863640" progId="Package">
                   <p:embed/>
                 </p:oleObj>
               </mc:Choice>
@@ -5166,7 +5166,7 @@
           <a:graphicData uri="http://schemas.openxmlformats.org/presentationml/2006/ole">
             <mc:AlternateContent xmlns:mc="http://schemas.openxmlformats.org/markup-compatibility/2006">
               <mc:Choice xmlns:v="urn:schemas-microsoft-com:vml" Requires="v">
-                <p:oleObj spid="_x0000_s6304" name="Packager Shell Object" showAsIcon="1" r:id="rId6" imgW="914400" imgH="792360" progId="Package">
+                <p:oleObj spid="_x0000_s6310" name="Packager Shell Object" showAsIcon="1" r:id="rId6" imgW="914400" imgH="792360" progId="Package">
                   <p:embed/>
                 </p:oleObj>
               </mc:Choice>
@@ -5229,7 +5229,7 @@
           <a:graphicData uri="http://schemas.openxmlformats.org/presentationml/2006/ole">
             <mc:AlternateContent xmlns:mc="http://schemas.openxmlformats.org/markup-compatibility/2006">
               <mc:Choice xmlns:v="urn:schemas-microsoft-com:vml" Requires="v">
-                <p:oleObj spid="_x0000_s6305" name="Worksheet" showAsIcon="1" r:id="rId8" imgW="914400" imgH="792360" progId="Excel.Sheet.12">
+                <p:oleObj spid="_x0000_s6311" name="Worksheet" showAsIcon="1" r:id="rId8" imgW="914400" imgH="792360" progId="Excel.Sheet.12">
                   <p:embed/>
                 </p:oleObj>
               </mc:Choice>
@@ -5774,7 +5774,15 @@
             </a:r>
             <a:r>
               <a:rPr lang="en-US" sz="2000" dirty="0"/>
-              <a:t> java -Dwebdriver.chrome.driver="&lt;&lt;driver file path&gt;&gt;\chromedriver.exe" –jar selmate-xls.jar --file &lt;&lt;input script path&gt;&gt;</a:t>
+              <a:t> java -Dwebdriver.chrome.driver="&lt;&lt;driver file path&gt;&gt;\chromedriver.exe" –</a:t>
+            </a:r>
+            <a:r>
+              <a:rPr lang="en-US" sz="2000"/>
+              <a:t>jar selmate-xls.</a:t>
+            </a:r>
+            <a:r>
+              <a:rPr lang="en-US" sz="2000" dirty="0"/>
+              <a:t>jar --file &lt;&lt;input script path&gt;&gt;</a:t>
             </a:r>
           </a:p>
           <a:p>
@@ -7455,7 +7463,7 @@
           <a:graphicData uri="http://schemas.openxmlformats.org/presentationml/2006/ole">
             <mc:AlternateContent xmlns:mc="http://schemas.openxmlformats.org/markup-compatibility/2006">
               <mc:Choice xmlns:v="urn:schemas-microsoft-com:vml" Requires="v">
-                <p:oleObj spid="_x0000_s1236" name="Worksheet" showAsIcon="1" r:id="rId3" imgW="914400" imgH="792360" progId="Excel.Sheet.12">
+                <p:oleObj spid="_x0000_s1238" name="Worksheet" showAsIcon="1" r:id="rId3" imgW="914400" imgH="792360" progId="Excel.Sheet.12">
                   <p:embed/>
                 </p:oleObj>
               </mc:Choice>
@@ -8147,7 +8155,7 @@
           <a:graphicData uri="http://schemas.openxmlformats.org/presentationml/2006/ole">
             <mc:AlternateContent xmlns:mc="http://schemas.openxmlformats.org/markup-compatibility/2006">
               <mc:Choice xmlns:v="urn:schemas-microsoft-com:vml" Requires="v">
-                <p:oleObj spid="_x0000_s2252" name="Packager Shell Object" showAsIcon="1" r:id="rId3" imgW="1332720" imgH="481320" progId="Package">
+                <p:oleObj spid="_x0000_s2254" name="Packager Shell Object" showAsIcon="1" r:id="rId3" imgW="1332720" imgH="481320" progId="Package">
                   <p:embed/>
                 </p:oleObj>
               </mc:Choice>
@@ -8462,7 +8470,7 @@
           <a:graphicData uri="http://schemas.openxmlformats.org/presentationml/2006/ole">
             <mc:AlternateContent xmlns:mc="http://schemas.openxmlformats.org/markup-compatibility/2006">
               <mc:Choice xmlns:v="urn:schemas-microsoft-com:vml" Requires="v">
-                <p:oleObj spid="_x0000_s3258" name="Worksheet" showAsIcon="1" r:id="rId4" imgW="914400" imgH="792360" progId="Excel.Sheet.12">
+                <p:oleObj spid="_x0000_s3260" name="Worksheet" showAsIcon="1" r:id="rId4" imgW="914400" imgH="792360" progId="Excel.Sheet.12">
                   <p:embed/>
                 </p:oleObj>
               </mc:Choice>

</xml_diff>

<commit_message>
Changes for load testing
</commit_message>
<xml_diff>
--- a/TUTORIAL.pptx
+++ b/TUTORIAL.pptx
@@ -25,8 +25,7 @@
     <p:sldId id="271" r:id="rId19"/>
     <p:sldId id="272" r:id="rId20"/>
     <p:sldId id="277" r:id="rId21"/>
-    <p:sldId id="274" r:id="rId22"/>
-    <p:sldId id="275" r:id="rId23"/>
+    <p:sldId id="275" r:id="rId22"/>
   </p:sldIdLst>
   <p:sldSz cx="12192000" cy="6858000"/>
   <p:notesSz cx="6858000" cy="9144000"/>
@@ -280,7 +279,7 @@
           <a:p>
             <a:fld id="{842CDB2F-11C8-47D8-BA5B-1ECFEA30C81C}" type="datetimeFigureOut">
               <a:rPr lang="en-US" smtClean="0"/>
-              <a:t>7/24/2020</a:t>
+              <a:t>12/24/2020</a:t>
             </a:fld>
             <a:endParaRPr lang="en-US"/>
           </a:p>
@@ -478,7 +477,7 @@
           <a:p>
             <a:fld id="{842CDB2F-11C8-47D8-BA5B-1ECFEA30C81C}" type="datetimeFigureOut">
               <a:rPr lang="en-US" smtClean="0"/>
-              <a:t>7/24/2020</a:t>
+              <a:t>12/24/2020</a:t>
             </a:fld>
             <a:endParaRPr lang="en-US"/>
           </a:p>
@@ -686,7 +685,7 @@
           <a:p>
             <a:fld id="{842CDB2F-11C8-47D8-BA5B-1ECFEA30C81C}" type="datetimeFigureOut">
               <a:rPr lang="en-US" smtClean="0"/>
-              <a:t>7/24/2020</a:t>
+              <a:t>12/24/2020</a:t>
             </a:fld>
             <a:endParaRPr lang="en-US"/>
           </a:p>
@@ -884,7 +883,7 @@
           <a:p>
             <a:fld id="{842CDB2F-11C8-47D8-BA5B-1ECFEA30C81C}" type="datetimeFigureOut">
               <a:rPr lang="en-US" smtClean="0"/>
-              <a:t>7/24/2020</a:t>
+              <a:t>12/24/2020</a:t>
             </a:fld>
             <a:endParaRPr lang="en-US"/>
           </a:p>
@@ -1159,7 +1158,7 @@
           <a:p>
             <a:fld id="{842CDB2F-11C8-47D8-BA5B-1ECFEA30C81C}" type="datetimeFigureOut">
               <a:rPr lang="en-US" smtClean="0"/>
-              <a:t>7/24/2020</a:t>
+              <a:t>12/24/2020</a:t>
             </a:fld>
             <a:endParaRPr lang="en-US"/>
           </a:p>
@@ -1424,7 +1423,7 @@
           <a:p>
             <a:fld id="{842CDB2F-11C8-47D8-BA5B-1ECFEA30C81C}" type="datetimeFigureOut">
               <a:rPr lang="en-US" smtClean="0"/>
-              <a:t>7/24/2020</a:t>
+              <a:t>12/24/2020</a:t>
             </a:fld>
             <a:endParaRPr lang="en-US"/>
           </a:p>
@@ -1836,7 +1835,7 @@
           <a:p>
             <a:fld id="{842CDB2F-11C8-47D8-BA5B-1ECFEA30C81C}" type="datetimeFigureOut">
               <a:rPr lang="en-US" smtClean="0"/>
-              <a:t>7/24/2020</a:t>
+              <a:t>12/24/2020</a:t>
             </a:fld>
             <a:endParaRPr lang="en-US"/>
           </a:p>
@@ -1977,7 +1976,7 @@
           <a:p>
             <a:fld id="{842CDB2F-11C8-47D8-BA5B-1ECFEA30C81C}" type="datetimeFigureOut">
               <a:rPr lang="en-US" smtClean="0"/>
-              <a:t>7/24/2020</a:t>
+              <a:t>12/24/2020</a:t>
             </a:fld>
             <a:endParaRPr lang="en-US"/>
           </a:p>
@@ -2090,7 +2089,7 @@
           <a:p>
             <a:fld id="{842CDB2F-11C8-47D8-BA5B-1ECFEA30C81C}" type="datetimeFigureOut">
               <a:rPr lang="en-US" smtClean="0"/>
-              <a:t>7/24/2020</a:t>
+              <a:t>12/24/2020</a:t>
             </a:fld>
             <a:endParaRPr lang="en-US"/>
           </a:p>
@@ -2401,7 +2400,7 @@
           <a:p>
             <a:fld id="{842CDB2F-11C8-47D8-BA5B-1ECFEA30C81C}" type="datetimeFigureOut">
               <a:rPr lang="en-US" smtClean="0"/>
-              <a:t>7/24/2020</a:t>
+              <a:t>12/24/2020</a:t>
             </a:fld>
             <a:endParaRPr lang="en-US"/>
           </a:p>
@@ -2689,7 +2688,7 @@
           <a:p>
             <a:fld id="{842CDB2F-11C8-47D8-BA5B-1ECFEA30C81C}" type="datetimeFigureOut">
               <a:rPr lang="en-US" smtClean="0"/>
-              <a:t>7/24/2020</a:t>
+              <a:t>12/24/2020</a:t>
             </a:fld>
             <a:endParaRPr lang="en-US"/>
           </a:p>
@@ -2930,7 +2929,7 @@
           <a:p>
             <a:fld id="{842CDB2F-11C8-47D8-BA5B-1ECFEA30C81C}" type="datetimeFigureOut">
               <a:rPr lang="en-US" smtClean="0"/>
-              <a:t>7/24/2020</a:t>
+              <a:t>12/24/2020</a:t>
             </a:fld>
             <a:endParaRPr lang="en-US"/>
           </a:p>
@@ -4021,7 +4020,7 @@
           <a:graphicData uri="http://schemas.openxmlformats.org/presentationml/2006/ole">
             <mc:AlternateContent xmlns:mc="http://schemas.openxmlformats.org/markup-compatibility/2006">
               <mc:Choice xmlns:v="urn:schemas-microsoft-com:vml" Requires="v">
-                <p:oleObj spid="_x0000_s4279" name="Packager Shell Object" showAsIcon="1" r:id="rId3" imgW="1028160" imgH="863640" progId="Package">
+                <p:oleObj spid="_x0000_s4297" name="Packager Shell Object" showAsIcon="1" r:id="rId3" imgW="1028160" imgH="863640" progId="Package">
                   <p:embed/>
                 </p:oleObj>
               </mc:Choice>
@@ -4393,7 +4392,7 @@
           <a:graphicData uri="http://schemas.openxmlformats.org/presentationml/2006/ole">
             <mc:AlternateContent xmlns:mc="http://schemas.openxmlformats.org/markup-compatibility/2006">
               <mc:Choice xmlns:v="urn:schemas-microsoft-com:vml" Requires="v">
-                <p:oleObj spid="_x0000_s7233" name="Worksheet" showAsIcon="1" r:id="rId4" imgW="914400" imgH="792360" progId="Excel.Sheet.12">
+                <p:oleObj spid="_x0000_s7251" name="Worksheet" showAsIcon="1" r:id="rId4" imgW="914400" imgH="792360" progId="Excel.Sheet.12">
                   <p:embed/>
                 </p:oleObj>
               </mc:Choice>
@@ -4534,7 +4533,7 @@
           <a:p>
             <a:r>
               <a:rPr lang="en-US" sz="2400" dirty="0"/>
-              <a:t>If ‘$’ has to be used as a constant in the input of previously mentioned commands, it has to be escaped by backslash(‘\’);</a:t>
+              <a:t>If ‘$’ is to be used as a constant in the input of previously mentioned commands, it should be escaped by backslash(‘\’);</a:t>
             </a:r>
           </a:p>
           <a:p>
@@ -4656,7 +4655,7 @@
           <a:p>
             <a:r>
               <a:rPr lang="en-US" sz="2400" dirty="0"/>
-              <a:t>User has to write java code using selmate-core interface components. The input script should be provided in xml format which is generated dynamically using java code. The selmate-core.jar should be used as a library in user project. The corresponding schema for the input xml is attached herewith. </a:t>
+              <a:t>User must write java code using selmate-core interface components. The input script should be provided in xml format which is generated dynamically using java code. The selmate-core.jar should be used as a library in user project. The corresponding schema for the input xml is attached herewith. </a:t>
             </a:r>
           </a:p>
           <a:p>
@@ -4724,7 +4723,7 @@
           <a:graphicData uri="http://schemas.openxmlformats.org/presentationml/2006/ole">
             <mc:AlternateContent xmlns:mc="http://schemas.openxmlformats.org/markup-compatibility/2006">
               <mc:Choice xmlns:v="urn:schemas-microsoft-com:vml" Requires="v">
-                <p:oleObj spid="_x0000_s5436" name="Packager Shell Object" showAsIcon="1" r:id="rId3" imgW="1231200" imgH="863640" progId="Package">
+                <p:oleObj spid="_x0000_s5472" name="Packager Shell Object" showAsIcon="1" r:id="rId3" imgW="1231200" imgH="863640" progId="Package">
                   <p:embed/>
                 </p:oleObj>
               </mc:Choice>
@@ -4787,7 +4786,7 @@
           <a:graphicData uri="http://schemas.openxmlformats.org/presentationml/2006/ole">
             <mc:AlternateContent xmlns:mc="http://schemas.openxmlformats.org/markup-compatibility/2006">
               <mc:Choice xmlns:v="urn:schemas-microsoft-com:vml" Requires="v">
-                <p:oleObj spid="_x0000_s5437" name="Packager Shell Object" showAsIcon="1" r:id="rId5" imgW="3757320" imgH="863640" progId="Package">
+                <p:oleObj spid="_x0000_s5473" name="Packager Shell Object" showAsIcon="1" r:id="rId5" imgW="3757320" imgH="863640" progId="Package">
                   <p:embed/>
                 </p:oleObj>
               </mc:Choice>
@@ -5043,7 +5042,7 @@
           <a:graphicData uri="http://schemas.openxmlformats.org/presentationml/2006/ole">
             <mc:AlternateContent xmlns:mc="http://schemas.openxmlformats.org/markup-compatibility/2006">
               <mc:Choice xmlns:v="urn:schemas-microsoft-com:vml" Requires="v">
-                <p:oleObj spid="_x0000_s6309" name="Packager Shell Object" showAsIcon="1" r:id="rId3" imgW="2868840" imgH="863640" progId="Package">
+                <p:oleObj spid="_x0000_s6363" name="Packager Shell Object" showAsIcon="1" r:id="rId3" imgW="2868840" imgH="863640" progId="Package">
                   <p:embed/>
                 </p:oleObj>
               </mc:Choice>
@@ -5166,7 +5165,7 @@
           <a:graphicData uri="http://schemas.openxmlformats.org/presentationml/2006/ole">
             <mc:AlternateContent xmlns:mc="http://schemas.openxmlformats.org/markup-compatibility/2006">
               <mc:Choice xmlns:v="urn:schemas-microsoft-com:vml" Requires="v">
-                <p:oleObj spid="_x0000_s6310" name="Packager Shell Object" showAsIcon="1" r:id="rId6" imgW="914400" imgH="792360" progId="Package">
+                <p:oleObj spid="_x0000_s6364" name="Packager Shell Object" showAsIcon="1" r:id="rId6" imgW="914400" imgH="792360" progId="Package">
                   <p:embed/>
                 </p:oleObj>
               </mc:Choice>
@@ -5229,7 +5228,7 @@
           <a:graphicData uri="http://schemas.openxmlformats.org/presentationml/2006/ole">
             <mc:AlternateContent xmlns:mc="http://schemas.openxmlformats.org/markup-compatibility/2006">
               <mc:Choice xmlns:v="urn:schemas-microsoft-com:vml" Requires="v">
-                <p:oleObj spid="_x0000_s6311" name="Worksheet" showAsIcon="1" r:id="rId8" imgW="914400" imgH="792360" progId="Excel.Sheet.12">
+                <p:oleObj spid="_x0000_s6365" name="Worksheet" showAsIcon="1" r:id="rId8" imgW="914400" imgH="792360" progId="Excel.Sheet.12">
                   <p:embed/>
                 </p:oleObj>
               </mc:Choice>
@@ -5754,13 +5753,13 @@
         <p:spPr/>
         <p:txBody>
           <a:bodyPr>
-            <a:normAutofit/>
+            <a:normAutofit fontScale="92500" lnSpcReduction="10000"/>
           </a:bodyPr>
           <a:lstStyle/>
           <a:p>
             <a:r>
               <a:rPr lang="en-US" sz="2400" dirty="0"/>
-              <a:t>Commands required to execute Selmate script for different browsers in windows environment are mentioned below. Each of the commands require the presence of corresponding driver for the browser.</a:t>
+              <a:t>Commands required to execute Selmate script in normal and bulk mode for different browsers in windows environment are mentioned below. Each of the commands require the presence of corresponding driver for the browser.</a:t>
             </a:r>
           </a:p>
           <a:p>
@@ -5774,15 +5773,43 @@
             </a:r>
             <a:r>
               <a:rPr lang="en-US" sz="2000" dirty="0"/>
-              <a:t> java -Dwebdriver.chrome.driver="&lt;&lt;driver file path&gt;&gt;\chromedriver.exe" –</a:t>
-            </a:r>
-            <a:r>
-              <a:rPr lang="en-US" sz="2000"/>
-              <a:t>jar selmate-xls.</a:t>
-            </a:r>
-            <a:r>
-              <a:rPr lang="en-US" sz="2000" dirty="0"/>
-              <a:t>jar --file &lt;&lt;input script path&gt;&gt;</a:t>
+              <a:t> </a:t>
+            </a:r>
+          </a:p>
+          <a:p>
+            <a:pPr marL="1257300" lvl="2" indent="-342900">
+              <a:buFont typeface="+mj-lt"/>
+              <a:buAutoNum type="alphaLcPeriod"/>
+            </a:pPr>
+            <a:r>
+              <a:rPr lang="en-US" sz="1600" dirty="0"/>
+              <a:t>java -Dwebdriver.chrome.driver="&lt;&lt;driver file path&gt;&gt;\chromedriver.exe" –jar selmate-xls.jar --file &lt;&lt;input script path&gt;&gt;</a:t>
+            </a:r>
+          </a:p>
+          <a:p>
+            <a:pPr marL="1257300" lvl="2" indent="-342900">
+              <a:buFont typeface="+mj-lt"/>
+              <a:buAutoNum type="alphaLcPeriod"/>
+            </a:pPr>
+            <a:r>
+              <a:rPr lang="en-US" sz="1600" dirty="0"/>
+              <a:t>java -Dwebdriver.chrome.driver="&lt;&lt;driver file path&gt;&gt;\chromedriver.exe" –</a:t>
+            </a:r>
+            <a:r>
+              <a:rPr lang="en-US" sz="1600" dirty="0" err="1"/>
+              <a:t>Dheadless</a:t>
+            </a:r>
+            <a:r>
+              <a:rPr lang="en-US" sz="1600" dirty="0"/>
+              <a:t>=true –jar selmate-xls.jar --bulk --</a:t>
+            </a:r>
+            <a:r>
+              <a:rPr lang="en-US" sz="1600" dirty="0" err="1"/>
+              <a:t>dir</a:t>
+            </a:r>
+            <a:r>
+              <a:rPr lang="en-US" sz="1600" dirty="0"/>
+              <a:t> &lt;&lt;directory path for input scripts&gt;&gt;</a:t>
             </a:r>
           </a:p>
           <a:p>
@@ -5796,7 +5823,51 @@
             </a:r>
             <a:r>
               <a:rPr lang="en-US" sz="2000" dirty="0"/>
-              <a:t> java -Dwebdriver.gecko.driver="&lt;&lt;driver file path&gt;&gt;\geckodriver.exe" –jar selmate-xls.jar --file &lt;&lt;input script path&gt;&gt;</a:t>
+              <a:t> </a:t>
+            </a:r>
+          </a:p>
+          <a:p>
+            <a:pPr marL="1257300" lvl="2" indent="-342900">
+              <a:buFont typeface="+mj-lt"/>
+              <a:buAutoNum type="alphaLcPeriod"/>
+            </a:pPr>
+            <a:r>
+              <a:rPr lang="en-US" sz="1600" dirty="0"/>
+              <a:t>java -Dwebdriver.gecko.driver="&lt;&lt;driver file path&gt;&gt;\geckodriver.exe" –jar selmate-xls.jar --file &lt;&lt;input script path&gt;&gt;</a:t>
+            </a:r>
+          </a:p>
+          <a:p>
+            <a:pPr marL="1257300" lvl="2" indent="-342900">
+              <a:buFont typeface="+mj-lt"/>
+              <a:buAutoNum type="alphaLcPeriod"/>
+            </a:pPr>
+            <a:r>
+              <a:rPr lang="en-US" sz="1600" dirty="0"/>
+              <a:t>java -</a:t>
+            </a:r>
+            <a:r>
+              <a:rPr lang="en-US" sz="1600" dirty="0" err="1"/>
+              <a:t>Dwebdriver.gecko.driver</a:t>
+            </a:r>
+            <a:r>
+              <a:rPr lang="en-US" sz="1600" dirty="0"/>
+              <a:t>="&lt;&lt;driver file path&gt;&gt;\geckodriver.exe“ –</a:t>
+            </a:r>
+            <a:r>
+              <a:rPr lang="en-US" sz="1600" dirty="0" err="1"/>
+              <a:t>Dheadless</a:t>
+            </a:r>
+            <a:r>
+              <a:rPr lang="en-US" sz="1600" dirty="0"/>
+              <a:t>=true –jar selmate-xls.jar --bulk --</a:t>
+            </a:r>
+            <a:r>
+              <a:rPr lang="en-US" sz="1600" dirty="0" err="1"/>
+              <a:t>dir</a:t>
+            </a:r>
+            <a:r>
+              <a:rPr lang="en-US" sz="1600" dirty="0"/>
+              <a:t> &lt;&lt; directory path for input scripts &gt;&gt;</a:t>
             </a:r>
           </a:p>
           <a:p>
@@ -5810,7 +5881,56 @@
             </a:r>
             <a:r>
               <a:rPr lang="en-US" sz="2000" dirty="0"/>
-              <a:t> java -Dwebdriver.ie.driver="&lt;&lt;driver file path&gt;&gt;\IEDriverServer.exe" –jar selmate-xls.jar --file &lt;&lt;input script path&gt;&gt;</a:t>
+              <a:t> </a:t>
+            </a:r>
+          </a:p>
+          <a:p>
+            <a:pPr marL="1257300" lvl="2" indent="-342900">
+              <a:buFont typeface="+mj-lt"/>
+              <a:buAutoNum type="alphaLcPeriod"/>
+            </a:pPr>
+            <a:r>
+              <a:rPr lang="en-US" sz="1600" dirty="0"/>
+              <a:t>java -Dwebdriver.ie.driver="&lt;&lt;driver file path&gt;&gt;\IEDriverServer.exe" –jar selmate-xls.jar --file &lt;&lt;input script path&gt;&gt;</a:t>
+            </a:r>
+          </a:p>
+          <a:p>
+            <a:pPr marL="1257300" lvl="2" indent="-342900">
+              <a:buFont typeface="+mj-lt"/>
+              <a:buAutoNum type="alphaLcPeriod"/>
+            </a:pPr>
+            <a:r>
+              <a:rPr lang="en-US" sz="1600" dirty="0"/>
+              <a:t>java -</a:t>
+            </a:r>
+            <a:r>
+              <a:rPr lang="en-US" sz="1600" dirty="0" err="1"/>
+              <a:t>Dwebdriver.ie.driver</a:t>
+            </a:r>
+            <a:r>
+              <a:rPr lang="en-US" sz="1600" dirty="0"/>
+              <a:t>="&lt;&lt;driver file path&gt;&gt;\IEDriverServer.exe" –jar selmate-xls.jar --bulk --</a:t>
+            </a:r>
+            <a:r>
+              <a:rPr lang="en-US" sz="1600" dirty="0" err="1"/>
+              <a:t>dir</a:t>
+            </a:r>
+            <a:r>
+              <a:rPr lang="en-US" sz="1600" dirty="0"/>
+              <a:t> &lt;&lt; directory path for input scripts &gt;&gt;</a:t>
+            </a:r>
+          </a:p>
+          <a:p>
+            <a:pPr marL="914400" lvl="2" indent="0">
+              <a:buNone/>
+            </a:pPr>
+            <a:r>
+              <a:rPr lang="en-US" sz="1600"/>
+              <a:t>        N</a:t>
+            </a:r>
+            <a:r>
+              <a:rPr lang="en-US" sz="1600" dirty="0"/>
+              <a:t>.B. Headless mode is not supported by IE.</a:t>
             </a:r>
           </a:p>
           <a:p>
@@ -6773,7 +6893,7 @@
           <p:cNvPr id="2" name="Title 1">
             <a:extLst>
               <a:ext uri="{FF2B5EF4-FFF2-40B4-BE49-F238E27FC236}">
-                <a16:creationId xmlns:a16="http://schemas.microsoft.com/office/drawing/2014/main" id="{A4ECEEAB-2FE8-4823-8C7A-79664FC9C7C4}"/>
+                <a16:creationId xmlns:a16="http://schemas.microsoft.com/office/drawing/2014/main" id="{00CFB931-B15F-4390-A42F-1DD0BA78DEDE}"/>
               </a:ext>
             </a:extLst>
           </p:cNvPr>
@@ -6808,7 +6928,7 @@
           <p:cNvPr id="3" name="Content Placeholder 2">
             <a:extLst>
               <a:ext uri="{FF2B5EF4-FFF2-40B4-BE49-F238E27FC236}">
-                <a16:creationId xmlns:a16="http://schemas.microsoft.com/office/drawing/2014/main" id="{7117E3FF-AA2D-4B46-BE35-838A45A5BAD5}"/>
+                <a16:creationId xmlns:a16="http://schemas.microsoft.com/office/drawing/2014/main" id="{58F64982-C086-4715-8958-1038B3EAFDA0}"/>
               </a:ext>
             </a:extLst>
           </p:cNvPr>
@@ -6823,189 +6943,6 @@
         <p:txBody>
           <a:bodyPr/>
           <a:lstStyle/>
-          <a:p>
-            <a:endParaRPr lang="en-US" dirty="0"/>
-          </a:p>
-          <a:p>
-            <a:endParaRPr lang="en-US" dirty="0"/>
-          </a:p>
-          <a:p>
-            <a:endParaRPr lang="en-US" dirty="0"/>
-          </a:p>
-          <a:p>
-            <a:pPr marL="0" indent="0" algn="ctr">
-              <a:buNone/>
-            </a:pPr>
-            <a:r>
-              <a:rPr lang="en-US" sz="5400" dirty="0">
-                <a:ln w="0"/>
-                <a:solidFill>
-                  <a:schemeClr val="accent1"/>
-                </a:solidFill>
-                <a:effectLst>
-                  <a:outerShdw blurRad="50800" dist="38100" dir="5400000" algn="t" rotWithShape="0">
-                    <a:prstClr val="black">
-                      <a:alpha val="40000"/>
-                    </a:prstClr>
-                  </a:outerShdw>
-                </a:effectLst>
-              </a:rPr>
-              <a:t>Q &amp;A</a:t>
-            </a:r>
-          </a:p>
-        </p:txBody>
-      </p:sp>
-      <p:pic>
-        <p:nvPicPr>
-          <p:cNvPr id="4" name="Picture 7" descr="R120_G137_B251-200">
-            <a:extLst>
-              <a:ext uri="{FF2B5EF4-FFF2-40B4-BE49-F238E27FC236}">
-                <a16:creationId xmlns:a16="http://schemas.microsoft.com/office/drawing/2014/main" id="{0362B93A-AC94-4F60-B1D0-D23C5BA8E91E}"/>
-              </a:ext>
-            </a:extLst>
-          </p:cNvPr>
-          <p:cNvPicPr>
-            <a:picLocks noChangeAspect="1" noChangeArrowheads="1"/>
-          </p:cNvPicPr>
-          <p:nvPr/>
-        </p:nvPicPr>
-        <p:blipFill>
-          <a:blip r:embed="rId2">
-            <a:extLst>
-              <a:ext uri="{28A0092B-C50C-407E-A947-70E740481C1C}">
-                <a14:useLocalDpi xmlns:a14="http://schemas.microsoft.com/office/drawing/2010/main" val="0"/>
-              </a:ext>
-            </a:extLst>
-          </a:blip>
-          <a:srcRect/>
-          <a:stretch>
-            <a:fillRect/>
-          </a:stretch>
-        </p:blipFill>
-        <p:spPr bwMode="auto">
-          <a:xfrm>
-            <a:off x="11353800" y="365125"/>
-            <a:ext cx="588963" cy="236537"/>
-          </a:xfrm>
-          <a:prstGeom prst="rect">
-            <a:avLst/>
-          </a:prstGeom>
-          <a:noFill/>
-          <a:ln>
-            <a:noFill/>
-          </a:ln>
-          <a:extLst>
-            <a:ext uri="{909E8E84-426E-40DD-AFC4-6F175D3DCCD1}">
-              <a14:hiddenFill xmlns:a14="http://schemas.microsoft.com/office/drawing/2010/main">
-                <a:solidFill>
-                  <a:srgbClr val="FFFFFF"/>
-                </a:solidFill>
-              </a14:hiddenFill>
-            </a:ext>
-            <a:ext uri="{91240B29-F687-4F45-9708-019B960494DF}">
-              <a14:hiddenLine xmlns:a14="http://schemas.microsoft.com/office/drawing/2010/main" w="9525">
-                <a:solidFill>
-                  <a:srgbClr val="000000"/>
-                </a:solidFill>
-                <a:miter lim="800000"/>
-                <a:headEnd/>
-                <a:tailEnd/>
-              </a14:hiddenLine>
-            </a:ext>
-          </a:extLst>
-        </p:spPr>
-      </p:pic>
-    </p:spTree>
-    <p:extLst>
-      <p:ext uri="{BB962C8B-B14F-4D97-AF65-F5344CB8AC3E}">
-        <p14:creationId xmlns:p14="http://schemas.microsoft.com/office/powerpoint/2010/main" val="2547330036"/>
-      </p:ext>
-    </p:extLst>
-  </p:cSld>
-  <p:clrMapOvr>
-    <a:masterClrMapping/>
-  </p:clrMapOvr>
-</p:sld>
-</file>
-
-<file path=ppt/slides/slide22.xml><?xml version="1.0" encoding="utf-8"?>
-<p:sld xmlns:a="http://schemas.openxmlformats.org/drawingml/2006/main" xmlns:r="http://schemas.openxmlformats.org/officeDocument/2006/relationships" xmlns:p="http://schemas.openxmlformats.org/presentationml/2006/main">
-  <p:cSld>
-    <p:spTree>
-      <p:nvGrpSpPr>
-        <p:cNvPr id="1" name=""/>
-        <p:cNvGrpSpPr/>
-        <p:nvPr/>
-      </p:nvGrpSpPr>
-      <p:grpSpPr>
-        <a:xfrm>
-          <a:off x="0" y="0"/>
-          <a:ext cx="0" cy="0"/>
-          <a:chOff x="0" y="0"/>
-          <a:chExt cx="0" cy="0"/>
-        </a:xfrm>
-      </p:grpSpPr>
-      <p:sp>
-        <p:nvSpPr>
-          <p:cNvPr id="2" name="Title 1">
-            <a:extLst>
-              <a:ext uri="{FF2B5EF4-FFF2-40B4-BE49-F238E27FC236}">
-                <a16:creationId xmlns:a16="http://schemas.microsoft.com/office/drawing/2014/main" id="{00CFB931-B15F-4390-A42F-1DD0BA78DEDE}"/>
-              </a:ext>
-            </a:extLst>
-          </p:cNvPr>
-          <p:cNvSpPr>
-            <a:spLocks noGrp="1"/>
-          </p:cNvSpPr>
-          <p:nvPr>
-            <p:ph type="title"/>
-          </p:nvPr>
-        </p:nvSpPr>
-        <p:spPr/>
-        <p:txBody>
-          <a:bodyPr/>
-          <a:lstStyle/>
-          <a:p>
-            <a:r>
-              <a:rPr lang="en-US" b="1" dirty="0">
-                <a:solidFill>
-                  <a:schemeClr val="accent1">
-                    <a:lumMod val="50000"/>
-                  </a:schemeClr>
-                </a:solidFill>
-              </a:rPr>
-              <a:t>Selmate</a:t>
-            </a:r>
-            <a:endParaRPr lang="en-US" dirty="0"/>
-          </a:p>
-        </p:txBody>
-      </p:sp>
-      <p:sp>
-        <p:nvSpPr>
-          <p:cNvPr id="3" name="Content Placeholder 2">
-            <a:extLst>
-              <a:ext uri="{FF2B5EF4-FFF2-40B4-BE49-F238E27FC236}">
-                <a16:creationId xmlns:a16="http://schemas.microsoft.com/office/drawing/2014/main" id="{58F64982-C086-4715-8958-1038B3EAFDA0}"/>
-              </a:ext>
-            </a:extLst>
-          </p:cNvPr>
-          <p:cNvSpPr>
-            <a:spLocks noGrp="1"/>
-          </p:cNvSpPr>
-          <p:nvPr>
-            <p:ph idx="1"/>
-          </p:nvPr>
-        </p:nvSpPr>
-        <p:spPr/>
-        <p:txBody>
-          <a:bodyPr/>
-          <a:lstStyle/>
-          <a:p>
-            <a:pPr marL="0" indent="0">
-              <a:buNone/>
-            </a:pPr>
-            <a:endParaRPr lang="en-US" dirty="0"/>
-          </a:p>
           <a:p>
             <a:pPr marL="0" indent="0">
               <a:buNone/>
@@ -7463,7 +7400,7 @@
           <a:graphicData uri="http://schemas.openxmlformats.org/presentationml/2006/ole">
             <mc:AlternateContent xmlns:mc="http://schemas.openxmlformats.org/markup-compatibility/2006">
               <mc:Choice xmlns:v="urn:schemas-microsoft-com:vml" Requires="v">
-                <p:oleObj spid="_x0000_s1238" name="Worksheet" showAsIcon="1" r:id="rId3" imgW="914400" imgH="792360" progId="Excel.Sheet.12">
+                <p:oleObj spid="_x0000_s1256" name="Worksheet" showAsIcon="1" r:id="rId3" imgW="914400" imgH="792360" progId="Excel.Sheet.12">
                   <p:embed/>
                 </p:oleObj>
               </mc:Choice>
@@ -8155,7 +8092,7 @@
           <a:graphicData uri="http://schemas.openxmlformats.org/presentationml/2006/ole">
             <mc:AlternateContent xmlns:mc="http://schemas.openxmlformats.org/markup-compatibility/2006">
               <mc:Choice xmlns:v="urn:schemas-microsoft-com:vml" Requires="v">
-                <p:oleObj spid="_x0000_s2254" name="Packager Shell Object" showAsIcon="1" r:id="rId3" imgW="1332720" imgH="481320" progId="Package">
+                <p:oleObj spid="_x0000_s2272" name="Packager Shell Object" showAsIcon="1" r:id="rId3" imgW="1332720" imgH="481320" progId="Package">
                   <p:embed/>
                 </p:oleObj>
               </mc:Choice>
@@ -8470,7 +8407,7 @@
           <a:graphicData uri="http://schemas.openxmlformats.org/presentationml/2006/ole">
             <mc:AlternateContent xmlns:mc="http://schemas.openxmlformats.org/markup-compatibility/2006">
               <mc:Choice xmlns:v="urn:schemas-microsoft-com:vml" Requires="v">
-                <p:oleObj spid="_x0000_s3260" name="Worksheet" showAsIcon="1" r:id="rId4" imgW="914400" imgH="792360" progId="Excel.Sheet.12">
+                <p:oleObj spid="_x0000_s3278" name="Worksheet" showAsIcon="1" r:id="rId4" imgW="914400" imgH="792360" progId="Excel.Sheet.12">
                   <p:embed/>
                 </p:oleObj>
               </mc:Choice>

</xml_diff>

<commit_message>
Updated for load testing
</commit_message>
<xml_diff>
--- a/TUTORIAL.pptx
+++ b/TUTORIAL.pptx
@@ -279,7 +279,7 @@
           <a:p>
             <a:fld id="{842CDB2F-11C8-47D8-BA5B-1ECFEA30C81C}" type="datetimeFigureOut">
               <a:rPr lang="en-US" smtClean="0"/>
-              <a:t>12/24/2020</a:t>
+              <a:t>1/1/2021</a:t>
             </a:fld>
             <a:endParaRPr lang="en-US"/>
           </a:p>
@@ -477,7 +477,7 @@
           <a:p>
             <a:fld id="{842CDB2F-11C8-47D8-BA5B-1ECFEA30C81C}" type="datetimeFigureOut">
               <a:rPr lang="en-US" smtClean="0"/>
-              <a:t>12/24/2020</a:t>
+              <a:t>1/1/2021</a:t>
             </a:fld>
             <a:endParaRPr lang="en-US"/>
           </a:p>
@@ -685,7 +685,7 @@
           <a:p>
             <a:fld id="{842CDB2F-11C8-47D8-BA5B-1ECFEA30C81C}" type="datetimeFigureOut">
               <a:rPr lang="en-US" smtClean="0"/>
-              <a:t>12/24/2020</a:t>
+              <a:t>1/1/2021</a:t>
             </a:fld>
             <a:endParaRPr lang="en-US"/>
           </a:p>
@@ -883,7 +883,7 @@
           <a:p>
             <a:fld id="{842CDB2F-11C8-47D8-BA5B-1ECFEA30C81C}" type="datetimeFigureOut">
               <a:rPr lang="en-US" smtClean="0"/>
-              <a:t>12/24/2020</a:t>
+              <a:t>1/1/2021</a:t>
             </a:fld>
             <a:endParaRPr lang="en-US"/>
           </a:p>
@@ -1158,7 +1158,7 @@
           <a:p>
             <a:fld id="{842CDB2F-11C8-47D8-BA5B-1ECFEA30C81C}" type="datetimeFigureOut">
               <a:rPr lang="en-US" smtClean="0"/>
-              <a:t>12/24/2020</a:t>
+              <a:t>1/1/2021</a:t>
             </a:fld>
             <a:endParaRPr lang="en-US"/>
           </a:p>
@@ -1423,7 +1423,7 @@
           <a:p>
             <a:fld id="{842CDB2F-11C8-47D8-BA5B-1ECFEA30C81C}" type="datetimeFigureOut">
               <a:rPr lang="en-US" smtClean="0"/>
-              <a:t>12/24/2020</a:t>
+              <a:t>1/1/2021</a:t>
             </a:fld>
             <a:endParaRPr lang="en-US"/>
           </a:p>
@@ -1835,7 +1835,7 @@
           <a:p>
             <a:fld id="{842CDB2F-11C8-47D8-BA5B-1ECFEA30C81C}" type="datetimeFigureOut">
               <a:rPr lang="en-US" smtClean="0"/>
-              <a:t>12/24/2020</a:t>
+              <a:t>1/1/2021</a:t>
             </a:fld>
             <a:endParaRPr lang="en-US"/>
           </a:p>
@@ -1976,7 +1976,7 @@
           <a:p>
             <a:fld id="{842CDB2F-11C8-47D8-BA5B-1ECFEA30C81C}" type="datetimeFigureOut">
               <a:rPr lang="en-US" smtClean="0"/>
-              <a:t>12/24/2020</a:t>
+              <a:t>1/1/2021</a:t>
             </a:fld>
             <a:endParaRPr lang="en-US"/>
           </a:p>
@@ -2089,7 +2089,7 @@
           <a:p>
             <a:fld id="{842CDB2F-11C8-47D8-BA5B-1ECFEA30C81C}" type="datetimeFigureOut">
               <a:rPr lang="en-US" smtClean="0"/>
-              <a:t>12/24/2020</a:t>
+              <a:t>1/1/2021</a:t>
             </a:fld>
             <a:endParaRPr lang="en-US"/>
           </a:p>
@@ -2400,7 +2400,7 @@
           <a:p>
             <a:fld id="{842CDB2F-11C8-47D8-BA5B-1ECFEA30C81C}" type="datetimeFigureOut">
               <a:rPr lang="en-US" smtClean="0"/>
-              <a:t>12/24/2020</a:t>
+              <a:t>1/1/2021</a:t>
             </a:fld>
             <a:endParaRPr lang="en-US"/>
           </a:p>
@@ -2688,7 +2688,7 @@
           <a:p>
             <a:fld id="{842CDB2F-11C8-47D8-BA5B-1ECFEA30C81C}" type="datetimeFigureOut">
               <a:rPr lang="en-US" smtClean="0"/>
-              <a:t>12/24/2020</a:t>
+              <a:t>1/1/2021</a:t>
             </a:fld>
             <a:endParaRPr lang="en-US"/>
           </a:p>
@@ -2929,7 +2929,7 @@
           <a:p>
             <a:fld id="{842CDB2F-11C8-47D8-BA5B-1ECFEA30C81C}" type="datetimeFigureOut">
               <a:rPr lang="en-US" smtClean="0"/>
-              <a:t>12/24/2020</a:t>
+              <a:t>1/1/2021</a:t>
             </a:fld>
             <a:endParaRPr lang="en-US"/>
           </a:p>
@@ -4020,7 +4020,7 @@
           <a:graphicData uri="http://schemas.openxmlformats.org/presentationml/2006/ole">
             <mc:AlternateContent xmlns:mc="http://schemas.openxmlformats.org/markup-compatibility/2006">
               <mc:Choice xmlns:v="urn:schemas-microsoft-com:vml" Requires="v">
-                <p:oleObj spid="_x0000_s4297" name="Packager Shell Object" showAsIcon="1" r:id="rId3" imgW="1028160" imgH="863640" progId="Package">
+                <p:oleObj spid="_x0000_s4298" name="Packager Shell Object" showAsIcon="1" r:id="rId3" imgW="1028160" imgH="863640" progId="Package">
                   <p:embed/>
                 </p:oleObj>
               </mc:Choice>
@@ -4392,7 +4392,7 @@
           <a:graphicData uri="http://schemas.openxmlformats.org/presentationml/2006/ole">
             <mc:AlternateContent xmlns:mc="http://schemas.openxmlformats.org/markup-compatibility/2006">
               <mc:Choice xmlns:v="urn:schemas-microsoft-com:vml" Requires="v">
-                <p:oleObj spid="_x0000_s7251" name="Worksheet" showAsIcon="1" r:id="rId4" imgW="914400" imgH="792360" progId="Excel.Sheet.12">
+                <p:oleObj spid="_x0000_s7252" name="Worksheet" showAsIcon="1" r:id="rId4" imgW="914400" imgH="792360" progId="Excel.Sheet.12">
                   <p:embed/>
                 </p:oleObj>
               </mc:Choice>
@@ -4723,7 +4723,7 @@
           <a:graphicData uri="http://schemas.openxmlformats.org/presentationml/2006/ole">
             <mc:AlternateContent xmlns:mc="http://schemas.openxmlformats.org/markup-compatibility/2006">
               <mc:Choice xmlns:v="urn:schemas-microsoft-com:vml" Requires="v">
-                <p:oleObj spid="_x0000_s5472" name="Packager Shell Object" showAsIcon="1" r:id="rId3" imgW="1231200" imgH="863640" progId="Package">
+                <p:oleObj spid="_x0000_s5474" name="Packager Shell Object" showAsIcon="1" r:id="rId3" imgW="1231200" imgH="863640" progId="Package">
                   <p:embed/>
                 </p:oleObj>
               </mc:Choice>
@@ -4786,7 +4786,7 @@
           <a:graphicData uri="http://schemas.openxmlformats.org/presentationml/2006/ole">
             <mc:AlternateContent xmlns:mc="http://schemas.openxmlformats.org/markup-compatibility/2006">
               <mc:Choice xmlns:v="urn:schemas-microsoft-com:vml" Requires="v">
-                <p:oleObj spid="_x0000_s5473" name="Packager Shell Object" showAsIcon="1" r:id="rId5" imgW="3757320" imgH="863640" progId="Package">
+                <p:oleObj spid="_x0000_s5475" name="Packager Shell Object" showAsIcon="1" r:id="rId5" imgW="3757320" imgH="863640" progId="Package">
                   <p:embed/>
                 </p:oleObj>
               </mc:Choice>
@@ -5042,7 +5042,7 @@
           <a:graphicData uri="http://schemas.openxmlformats.org/presentationml/2006/ole">
             <mc:AlternateContent xmlns:mc="http://schemas.openxmlformats.org/markup-compatibility/2006">
               <mc:Choice xmlns:v="urn:schemas-microsoft-com:vml" Requires="v">
-                <p:oleObj spid="_x0000_s6363" name="Packager Shell Object" showAsIcon="1" r:id="rId3" imgW="2868840" imgH="863640" progId="Package">
+                <p:oleObj spid="_x0000_s6366" name="Packager Shell Object" showAsIcon="1" r:id="rId3" imgW="2868840" imgH="863640" progId="Package">
                   <p:embed/>
                 </p:oleObj>
               </mc:Choice>
@@ -5165,7 +5165,7 @@
           <a:graphicData uri="http://schemas.openxmlformats.org/presentationml/2006/ole">
             <mc:AlternateContent xmlns:mc="http://schemas.openxmlformats.org/markup-compatibility/2006">
               <mc:Choice xmlns:v="urn:schemas-microsoft-com:vml" Requires="v">
-                <p:oleObj spid="_x0000_s6364" name="Packager Shell Object" showAsIcon="1" r:id="rId6" imgW="914400" imgH="792360" progId="Package">
+                <p:oleObj spid="_x0000_s6367" name="Packager Shell Object" showAsIcon="1" r:id="rId6" imgW="914400" imgH="792360" progId="Package">
                   <p:embed/>
                 </p:oleObj>
               </mc:Choice>
@@ -5228,7 +5228,7 @@
           <a:graphicData uri="http://schemas.openxmlformats.org/presentationml/2006/ole">
             <mc:AlternateContent xmlns:mc="http://schemas.openxmlformats.org/markup-compatibility/2006">
               <mc:Choice xmlns:v="urn:schemas-microsoft-com:vml" Requires="v">
-                <p:oleObj spid="_x0000_s6365" name="Worksheet" showAsIcon="1" r:id="rId8" imgW="914400" imgH="792360" progId="Excel.Sheet.12">
+                <p:oleObj spid="_x0000_s6368" name="Worksheet" showAsIcon="1" r:id="rId8" imgW="914400" imgH="792360" progId="Excel.Sheet.12">
                   <p:embed/>
                 </p:oleObj>
               </mc:Choice>
@@ -5793,23 +5793,7 @@
             </a:pPr>
             <a:r>
               <a:rPr lang="en-US" sz="1600" dirty="0"/>
-              <a:t>java -Dwebdriver.chrome.driver="&lt;&lt;driver file path&gt;&gt;\chromedriver.exe" –</a:t>
-            </a:r>
-            <a:r>
-              <a:rPr lang="en-US" sz="1600" dirty="0" err="1"/>
-              <a:t>Dheadless</a:t>
-            </a:r>
-            <a:r>
-              <a:rPr lang="en-US" sz="1600" dirty="0"/>
-              <a:t>=true –jar selmate-xls.jar --bulk --</a:t>
-            </a:r>
-            <a:r>
-              <a:rPr lang="en-US" sz="1600" dirty="0" err="1"/>
-              <a:t>dir</a:t>
-            </a:r>
-            <a:r>
-              <a:rPr lang="en-US" sz="1600" dirty="0"/>
-              <a:t> &lt;&lt;directory path for input scripts&gt;&gt;</a:t>
+              <a:t>java -Dwebdriver.chrome.driver="&lt;&lt;driver file path&gt;&gt;\chromedriver.exe" –Dheadless=true –jar selmate-xls.jar --bulk  --dir &lt;&lt;directory path for input scripts&gt;&gt;</a:t>
             </a:r>
           </a:p>
           <a:p>
@@ -5843,31 +5827,7 @@
             </a:pPr>
             <a:r>
               <a:rPr lang="en-US" sz="1600" dirty="0"/>
-              <a:t>java -</a:t>
-            </a:r>
-            <a:r>
-              <a:rPr lang="en-US" sz="1600" dirty="0" err="1"/>
-              <a:t>Dwebdriver.gecko.driver</a:t>
-            </a:r>
-            <a:r>
-              <a:rPr lang="en-US" sz="1600" dirty="0"/>
-              <a:t>="&lt;&lt;driver file path&gt;&gt;\geckodriver.exe“ –</a:t>
-            </a:r>
-            <a:r>
-              <a:rPr lang="en-US" sz="1600" dirty="0" err="1"/>
-              <a:t>Dheadless</a:t>
-            </a:r>
-            <a:r>
-              <a:rPr lang="en-US" sz="1600" dirty="0"/>
-              <a:t>=true –jar selmate-xls.jar --bulk --</a:t>
-            </a:r>
-            <a:r>
-              <a:rPr lang="en-US" sz="1600" dirty="0" err="1"/>
-              <a:t>dir</a:t>
-            </a:r>
-            <a:r>
-              <a:rPr lang="en-US" sz="1600" dirty="0"/>
-              <a:t> &lt;&lt; directory path for input scripts &gt;&gt;</a:t>
+              <a:t>java -Dwebdriver.gecko.driver="&lt;&lt;driver file path&gt;&gt;\geckodriver.exe“ –Dheadless=true –jar selmate-xls.jar --bulk --dir &lt;&lt; directory path for input scripts &gt;&gt;</a:t>
             </a:r>
           </a:p>
           <a:p>
@@ -5901,23 +5861,7 @@
             </a:pPr>
             <a:r>
               <a:rPr lang="en-US" sz="1600" dirty="0"/>
-              <a:t>java -</a:t>
-            </a:r>
-            <a:r>
-              <a:rPr lang="en-US" sz="1600" dirty="0" err="1"/>
-              <a:t>Dwebdriver.ie.driver</a:t>
-            </a:r>
-            <a:r>
-              <a:rPr lang="en-US" sz="1600" dirty="0"/>
-              <a:t>="&lt;&lt;driver file path&gt;&gt;\IEDriverServer.exe" –jar selmate-xls.jar --bulk --</a:t>
-            </a:r>
-            <a:r>
-              <a:rPr lang="en-US" sz="1600" dirty="0" err="1"/>
-              <a:t>dir</a:t>
-            </a:r>
-            <a:r>
-              <a:rPr lang="en-US" sz="1600" dirty="0"/>
-              <a:t> &lt;&lt; directory path for input scripts &gt;&gt;</a:t>
+              <a:t>java -Dwebdriver.ie.driver="&lt;&lt;driver file path&gt;&gt;\IEDriverServer.exe" –jar selmate-xls.jar --bulk --dir &lt;&lt; directory path for input scripts &gt;&gt;</a:t>
             </a:r>
           </a:p>
           <a:p>
@@ -5925,12 +5869,8 @@
               <a:buNone/>
             </a:pPr>
             <a:r>
-              <a:rPr lang="en-US" sz="1600"/>
-              <a:t>        N</a:t>
-            </a:r>
-            <a:r>
               <a:rPr lang="en-US" sz="1600" dirty="0"/>
-              <a:t>.B. Headless mode is not supported by IE.</a:t>
+              <a:t>        N.B. Headless mode is not supported by IE.</a:t>
             </a:r>
           </a:p>
           <a:p>
@@ -7400,7 +7340,7 @@
           <a:graphicData uri="http://schemas.openxmlformats.org/presentationml/2006/ole">
             <mc:AlternateContent xmlns:mc="http://schemas.openxmlformats.org/markup-compatibility/2006">
               <mc:Choice xmlns:v="urn:schemas-microsoft-com:vml" Requires="v">
-                <p:oleObj spid="_x0000_s1256" name="Worksheet" showAsIcon="1" r:id="rId3" imgW="914400" imgH="792360" progId="Excel.Sheet.12">
+                <p:oleObj spid="_x0000_s1257" name="Worksheet" showAsIcon="1" r:id="rId3" imgW="914400" imgH="792360" progId="Excel.Sheet.12">
                   <p:embed/>
                 </p:oleObj>
               </mc:Choice>
@@ -8092,7 +8032,7 @@
           <a:graphicData uri="http://schemas.openxmlformats.org/presentationml/2006/ole">
             <mc:AlternateContent xmlns:mc="http://schemas.openxmlformats.org/markup-compatibility/2006">
               <mc:Choice xmlns:v="urn:schemas-microsoft-com:vml" Requires="v">
-                <p:oleObj spid="_x0000_s2272" name="Packager Shell Object" showAsIcon="1" r:id="rId3" imgW="1332720" imgH="481320" progId="Package">
+                <p:oleObj spid="_x0000_s2273" name="Packager Shell Object" showAsIcon="1" r:id="rId3" imgW="1332720" imgH="481320" progId="Package">
                   <p:embed/>
                 </p:oleObj>
               </mc:Choice>
@@ -8407,7 +8347,7 @@
           <a:graphicData uri="http://schemas.openxmlformats.org/presentationml/2006/ole">
             <mc:AlternateContent xmlns:mc="http://schemas.openxmlformats.org/markup-compatibility/2006">
               <mc:Choice xmlns:v="urn:schemas-microsoft-com:vml" Requires="v">
-                <p:oleObj spid="_x0000_s3278" name="Worksheet" showAsIcon="1" r:id="rId4" imgW="914400" imgH="792360" progId="Excel.Sheet.12">
+                <p:oleObj spid="_x0000_s3279" name="Worksheet" showAsIcon="1" r:id="rId4" imgW="914400" imgH="792360" progId="Excel.Sheet.12">
                   <p:embed/>
                 </p:oleObj>
               </mc:Choice>

</xml_diff>